<commit_message>
Worked on Installation and Console slides
</commit_message>
<xml_diff>
--- a/Slides/1. Introduction to the .NET FRAMEWORK/1. Intoduction to .NET.pptx
+++ b/Slides/1. Introduction to the .NET FRAMEWORK/1. Intoduction to .NET.pptx
@@ -122,6 +122,11 @@
       </a:defRPr>
     </a:lvl9pPr>
   </p:defaultTextStyle>
+  <p:extLst>
+    <p:ext uri="{EFAFB233-063F-42B5-8137-9DF3F51BA10A}">
+      <p15:sldGuideLst xmlns:p15="http://schemas.microsoft.com/office/powerpoint/2012/main"/>
+    </p:ext>
+  </p:extLst>
 </p:presentation>
 </file>
 
@@ -27156,7 +27161,7 @@
                 <a:latin typeface="Times New Roman" panose="02020603050405020304" pitchFamily="18" charset="0"/>
                 <a:cs typeface="Times New Roman" panose="02020603050405020304" pitchFamily="18" charset="0"/>
               </a:rPr>
-              <a:t>C#</a:t>
+              <a:t>.NET</a:t>
             </a:r>
             <a:br>
               <a:rPr lang="en" sz="5400" b="1" dirty="0">

</xml_diff>

<commit_message>
Working on Variables and Constants
</commit_message>
<xml_diff>
--- a/Slides/1. Introduction to the .NET FRAMEWORK/1. Intoduction to .NET.pptx
+++ b/Slides/1. Introduction to the .NET FRAMEWORK/1. Intoduction to .NET.pptx
@@ -5,25 +5,26 @@
     <p:sldMasterId id="2147483648" r:id="rId1"/>
   </p:sldMasterIdLst>
   <p:notesMasterIdLst>
-    <p:notesMasterId r:id="rId18"/>
+    <p:notesMasterId r:id="rId19"/>
   </p:notesMasterIdLst>
   <p:sldIdLst>
     <p:sldId id="258" r:id="rId2"/>
     <p:sldId id="257" r:id="rId3"/>
-    <p:sldId id="259" r:id="rId4"/>
-    <p:sldId id="260" r:id="rId5"/>
-    <p:sldId id="261" r:id="rId6"/>
-    <p:sldId id="262" r:id="rId7"/>
-    <p:sldId id="263" r:id="rId8"/>
-    <p:sldId id="264" r:id="rId9"/>
-    <p:sldId id="265" r:id="rId10"/>
-    <p:sldId id="266" r:id="rId11"/>
-    <p:sldId id="267" r:id="rId12"/>
-    <p:sldId id="268" r:id="rId13"/>
-    <p:sldId id="269" r:id="rId14"/>
-    <p:sldId id="270" r:id="rId15"/>
-    <p:sldId id="271" r:id="rId16"/>
-    <p:sldId id="272" r:id="rId17"/>
+    <p:sldId id="273" r:id="rId4"/>
+    <p:sldId id="259" r:id="rId5"/>
+    <p:sldId id="260" r:id="rId6"/>
+    <p:sldId id="261" r:id="rId7"/>
+    <p:sldId id="262" r:id="rId8"/>
+    <p:sldId id="263" r:id="rId9"/>
+    <p:sldId id="264" r:id="rId10"/>
+    <p:sldId id="265" r:id="rId11"/>
+    <p:sldId id="266" r:id="rId12"/>
+    <p:sldId id="267" r:id="rId13"/>
+    <p:sldId id="268" r:id="rId14"/>
+    <p:sldId id="269" r:id="rId15"/>
+    <p:sldId id="270" r:id="rId16"/>
+    <p:sldId id="271" r:id="rId17"/>
+    <p:sldId id="272" r:id="rId18"/>
   </p:sldIdLst>
   <p:sldSz cx="12192000" cy="6858000"/>
   <p:notesSz cx="6858000" cy="9144000"/>
@@ -212,7 +213,7 @@
           <a:p>
             <a:fld id="{D212E259-F3DF-4B20-A6F7-DD0F3F5F044C}" type="datetimeFigureOut">
               <a:rPr lang="en-US" smtClean="0"/>
-              <a:t>5/6/2023</a:t>
+              <a:t>5/23/2023</a:t>
             </a:fld>
             <a:endParaRPr lang="en-US"/>
           </a:p>
@@ -27211,6 +27212,196 @@
           <p:cNvPr id="2" name="Title 1">
             <a:extLst>
               <a:ext uri="{FF2B5EF4-FFF2-40B4-BE49-F238E27FC236}">
+                <a16:creationId xmlns:a16="http://schemas.microsoft.com/office/drawing/2014/main" id="{A05F68E3-B9B8-2A58-DD21-F2C2E665ED15}"/>
+              </a:ext>
+            </a:extLst>
+          </p:cNvPr>
+          <p:cNvSpPr>
+            <a:spLocks noGrp="1"/>
+          </p:cNvSpPr>
+          <p:nvPr>
+            <p:ph type="title"/>
+          </p:nvPr>
+        </p:nvSpPr>
+        <p:spPr>
+          <a:xfrm>
+            <a:off x="609600" y="807467"/>
+            <a:ext cx="11109820" cy="668995"/>
+          </a:xfrm>
+        </p:spPr>
+        <p:txBody>
+          <a:bodyPr/>
+          <a:lstStyle/>
+          <a:p>
+            <a:r>
+              <a:rPr lang="en-US" dirty="0"/>
+              <a:t>Introduction to the  .NET Framework</a:t>
+            </a:r>
+          </a:p>
+        </p:txBody>
+      </p:sp>
+      <p:sp>
+        <p:nvSpPr>
+          <p:cNvPr id="3" name="Text Placeholder 2">
+            <a:extLst>
+              <a:ext uri="{FF2B5EF4-FFF2-40B4-BE49-F238E27FC236}">
+                <a16:creationId xmlns:a16="http://schemas.microsoft.com/office/drawing/2014/main" id="{F6501655-68EE-EF22-94CF-111088B41AEA}"/>
+              </a:ext>
+            </a:extLst>
+          </p:cNvPr>
+          <p:cNvSpPr>
+            <a:spLocks noGrp="1"/>
+          </p:cNvSpPr>
+          <p:nvPr>
+            <p:ph type="body" idx="1"/>
+          </p:nvPr>
+        </p:nvSpPr>
+        <p:spPr>
+          <a:xfrm>
+            <a:off x="609600" y="2382472"/>
+            <a:ext cx="11227266" cy="4085439"/>
+          </a:xfrm>
+        </p:spPr>
+        <p:txBody>
+          <a:bodyPr/>
+          <a:lstStyle/>
+          <a:p>
+            <a:pPr marL="152396" indent="0">
+              <a:buNone/>
+            </a:pPr>
+            <a:r>
+              <a:rPr lang="en-US" sz="1800" b="1" i="0" dirty="0">
+                <a:solidFill>
+                  <a:srgbClr val="000000"/>
+                </a:solidFill>
+                <a:effectLst/>
+                <a:latin typeface="arial" panose="020B0604020202020204" pitchFamily="34" charset="0"/>
+              </a:rPr>
+              <a:t>NET</a:t>
+            </a:r>
+            <a:r>
+              <a:rPr lang="en-US" sz="1800" b="0" i="0" dirty="0">
+                <a:solidFill>
+                  <a:srgbClr val="000000"/>
+                </a:solidFill>
+                <a:effectLst/>
+                <a:latin typeface="arial" panose="020B0604020202020204" pitchFamily="34" charset="0"/>
+              </a:rPr>
+              <a:t> stands for </a:t>
+            </a:r>
+            <a:r>
+              <a:rPr lang="en-US" sz="1800" b="1" i="0" dirty="0">
+                <a:solidFill>
+                  <a:srgbClr val="000000"/>
+                </a:solidFill>
+                <a:effectLst/>
+                <a:latin typeface="arial" panose="020B0604020202020204" pitchFamily="34" charset="0"/>
+              </a:rPr>
+              <a:t>Network Enabled Technology</a:t>
+            </a:r>
+            <a:r>
+              <a:rPr lang="en-US" sz="1800" b="0" i="0" dirty="0">
+                <a:solidFill>
+                  <a:srgbClr val="000000"/>
+                </a:solidFill>
+                <a:effectLst/>
+                <a:latin typeface="arial" panose="020B0604020202020204" pitchFamily="34" charset="0"/>
+              </a:rPr>
+              <a:t> (Internet). In .NET, dot (.) refers to </a:t>
+            </a:r>
+            <a:r>
+              <a:rPr lang="en-US" sz="1800" b="1" i="0" dirty="0">
+                <a:solidFill>
+                  <a:srgbClr val="000000"/>
+                </a:solidFill>
+                <a:effectLst/>
+                <a:latin typeface="arial" panose="020B0604020202020204" pitchFamily="34" charset="0"/>
+              </a:rPr>
+              <a:t>Object-Oriented,</a:t>
+            </a:r>
+            <a:r>
+              <a:rPr lang="en-US" sz="1800" b="0" i="0" dirty="0">
+                <a:solidFill>
+                  <a:srgbClr val="000000"/>
+                </a:solidFill>
+                <a:effectLst/>
+                <a:latin typeface="arial" panose="020B0604020202020204" pitchFamily="34" charset="0"/>
+              </a:rPr>
+              <a:t> and NET refers to the internet. So, the complete .NET means through Object-Oriented we can implement internet-based applications.</a:t>
+            </a:r>
+          </a:p>
+          <a:p>
+            <a:pPr marL="152396" indent="0">
+              <a:buNone/>
+            </a:pPr>
+            <a:r>
+              <a:rPr lang="en-US" sz="1800" dirty="0"/>
+              <a:t>According to Microsoft, .NET is a Free, Cross-Platform, Open-Source developer platform for building many different types of applications. With .NET, we can use multiple languages (C#, VB, F#, etc.), Editors (Visual Studio, Visual Studio Code, Visual Studio for Mac, OmniSharp, JetBrains Rider, etc.), and Libraries to build for Web, Mobile, Desktop, Games, IoT, and more.</a:t>
+            </a:r>
+          </a:p>
+          <a:p>
+            <a:pPr marL="152396" indent="0">
+              <a:buNone/>
+            </a:pPr>
+            <a:r>
+              <a:rPr lang="en-US" sz="1800" dirty="0"/>
+              <a:t>Cross Platform: Whether you are working in C#, F#, or Visual Basic, your code will run on any compatible operating system. You can build many types of apps with .NET. Some are Cross-Platform, and some target a specific set of operating systems and devices.</a:t>
+            </a:r>
+          </a:p>
+          <a:p>
+            <a:pPr marL="152396" indent="0">
+              <a:buNone/>
+            </a:pPr>
+            <a:r>
+              <a:rPr lang="en-US" sz="1800" dirty="0"/>
+              <a:t>Libraries: To extend functionality, Microsoft and others maintain a healthy .NET package ecosystem. </a:t>
+            </a:r>
+            <a:r>
+              <a:rPr lang="en-US" sz="1800" b="1" dirty="0"/>
+              <a:t>NuGet</a:t>
+            </a:r>
+            <a:r>
+              <a:rPr lang="en-US" sz="1800" dirty="0"/>
+              <a:t> is a package manager built specifically for .NET that contains over 100,000 packages.</a:t>
+            </a:r>
+          </a:p>
+        </p:txBody>
+      </p:sp>
+    </p:spTree>
+    <p:extLst>
+      <p:ext uri="{BB962C8B-B14F-4D97-AF65-F5344CB8AC3E}">
+        <p14:creationId xmlns:p14="http://schemas.microsoft.com/office/powerpoint/2010/main" val="2998746075"/>
+      </p:ext>
+    </p:extLst>
+  </p:cSld>
+  <p:clrMapOvr>
+    <a:masterClrMapping/>
+  </p:clrMapOvr>
+</p:sld>
+</file>
+
+<file path=ppt/slides/slide11.xml><?xml version="1.0" encoding="utf-8"?>
+<p:sld xmlns:a="http://schemas.openxmlformats.org/drawingml/2006/main" xmlns:r="http://schemas.openxmlformats.org/officeDocument/2006/relationships" xmlns:p="http://schemas.openxmlformats.org/presentationml/2006/main">
+  <p:cSld>
+    <p:spTree>
+      <p:nvGrpSpPr>
+        <p:cNvPr id="1" name=""/>
+        <p:cNvGrpSpPr/>
+        <p:nvPr/>
+      </p:nvGrpSpPr>
+      <p:grpSpPr>
+        <a:xfrm>
+          <a:off x="0" y="0"/>
+          <a:ext cx="0" cy="0"/>
+          <a:chOff x="0" y="0"/>
+          <a:chExt cx="0" cy="0"/>
+        </a:xfrm>
+      </p:grpSpPr>
+      <p:sp>
+        <p:nvSpPr>
+          <p:cNvPr id="2" name="Title 1">
+            <a:extLst>
+              <a:ext uri="{FF2B5EF4-FFF2-40B4-BE49-F238E27FC236}">
                 <a16:creationId xmlns:a16="http://schemas.microsoft.com/office/drawing/2014/main" id="{CF74EB80-DA55-E5E0-A980-E8BCCEC1A376}"/>
               </a:ext>
             </a:extLst>
@@ -27350,7 +27541,7 @@
 </p:sld>
 </file>
 
-<file path=ppt/slides/slide11.xml><?xml version="1.0" encoding="utf-8"?>
+<file path=ppt/slides/slide12.xml><?xml version="1.0" encoding="utf-8"?>
 <p:sld xmlns:a="http://schemas.openxmlformats.org/drawingml/2006/main" xmlns:r="http://schemas.openxmlformats.org/officeDocument/2006/relationships" xmlns:p="http://schemas.openxmlformats.org/presentationml/2006/main">
   <p:cSld>
     <p:spTree>
@@ -27464,7 +27655,7 @@
 </p:sld>
 </file>
 
-<file path=ppt/slides/slide12.xml><?xml version="1.0" encoding="utf-8"?>
+<file path=ppt/slides/slide13.xml><?xml version="1.0" encoding="utf-8"?>
 <p:sld xmlns:a="http://schemas.openxmlformats.org/drawingml/2006/main" xmlns:r="http://schemas.openxmlformats.org/officeDocument/2006/relationships" xmlns:p="http://schemas.openxmlformats.org/presentationml/2006/main">
   <p:cSld>
     <p:spTree>
@@ -27556,7 +27747,7 @@
 </p:sld>
 </file>
 
-<file path=ppt/slides/slide13.xml><?xml version="1.0" encoding="utf-8"?>
+<file path=ppt/slides/slide14.xml><?xml version="1.0" encoding="utf-8"?>
 <p:sld xmlns:a="http://schemas.openxmlformats.org/drawingml/2006/main" xmlns:r="http://schemas.openxmlformats.org/officeDocument/2006/relationships" xmlns:p="http://schemas.openxmlformats.org/presentationml/2006/main">
   <p:cSld>
     <p:spTree>
@@ -27676,7 +27867,7 @@
 </p:sld>
 </file>
 
-<file path=ppt/slides/slide14.xml><?xml version="1.0" encoding="utf-8"?>
+<file path=ppt/slides/slide15.xml><?xml version="1.0" encoding="utf-8"?>
 <p:sld xmlns:a="http://schemas.openxmlformats.org/drawingml/2006/main" xmlns:r="http://schemas.openxmlformats.org/officeDocument/2006/relationships" xmlns:p="http://schemas.openxmlformats.org/presentationml/2006/main">
   <p:cSld>
     <p:spTree>
@@ -27857,7 +28048,7 @@
 </p:sld>
 </file>
 
-<file path=ppt/slides/slide15.xml><?xml version="1.0" encoding="utf-8"?>
+<file path=ppt/slides/slide16.xml><?xml version="1.0" encoding="utf-8"?>
 <p:sld xmlns:a="http://schemas.openxmlformats.org/drawingml/2006/main" xmlns:r="http://schemas.openxmlformats.org/officeDocument/2006/relationships" xmlns:p="http://schemas.openxmlformats.org/presentationml/2006/main">
   <p:cSld>
     <p:spTree>
@@ -27977,7 +28168,7 @@
 </p:sld>
 </file>
 
-<file path=ppt/slides/slide16.xml><?xml version="1.0" encoding="utf-8"?>
+<file path=ppt/slides/slide17.xml><?xml version="1.0" encoding="utf-8"?>
 <p:sld xmlns:a="http://schemas.openxmlformats.org/drawingml/2006/main" xmlns:r="http://schemas.openxmlformats.org/officeDocument/2006/relationships" xmlns:p="http://schemas.openxmlformats.org/presentationml/2006/main">
   <p:cSld>
     <p:spTree>
@@ -28532,6 +28723,123 @@
           <p:cNvPr id="2" name="Title 1">
             <a:extLst>
               <a:ext uri="{FF2B5EF4-FFF2-40B4-BE49-F238E27FC236}">
+                <a16:creationId xmlns:a16="http://schemas.microsoft.com/office/drawing/2014/main" id="{93AAFD06-0D7B-2F11-E272-1C8383476237}"/>
+              </a:ext>
+            </a:extLst>
+          </p:cNvPr>
+          <p:cNvSpPr>
+            <a:spLocks noGrp="1"/>
+          </p:cNvSpPr>
+          <p:nvPr>
+            <p:ph type="title"/>
+          </p:nvPr>
+        </p:nvSpPr>
+        <p:spPr/>
+        <p:txBody>
+          <a:bodyPr/>
+          <a:lstStyle/>
+          <a:p>
+            <a:r>
+              <a:rPr lang="en-US" dirty="0"/>
+              <a:t>History Time</a:t>
+            </a:r>
+          </a:p>
+        </p:txBody>
+      </p:sp>
+      <p:sp>
+        <p:nvSpPr>
+          <p:cNvPr id="3" name="Text Placeholder 2">
+            <a:extLst>
+              <a:ext uri="{FF2B5EF4-FFF2-40B4-BE49-F238E27FC236}">
+                <a16:creationId xmlns:a16="http://schemas.microsoft.com/office/drawing/2014/main" id="{3468B719-1855-26EB-1781-C7C6DE813841}"/>
+              </a:ext>
+            </a:extLst>
+          </p:cNvPr>
+          <p:cNvSpPr>
+            <a:spLocks noGrp="1"/>
+          </p:cNvSpPr>
+          <p:nvPr>
+            <p:ph type="body" idx="1"/>
+          </p:nvPr>
+        </p:nvSpPr>
+        <p:spPr>
+          <a:xfrm>
+            <a:off x="609599" y="1610685"/>
+            <a:ext cx="11168543" cy="4915949"/>
+          </a:xfrm>
+        </p:spPr>
+        <p:txBody>
+          <a:bodyPr/>
+          <a:lstStyle/>
+          <a:p>
+            <a:r>
+              <a:rPr lang="en-US" dirty="0"/>
+              <a:t>Before C# there were tow languages in the C family :c and </a:t>
+            </a:r>
+            <a:r>
+              <a:rPr lang="en-US" dirty="0" err="1"/>
+              <a:t>c++</a:t>
+            </a:r>
+            <a:r>
+              <a:rPr lang="en-US" dirty="0"/>
+              <a:t>.</a:t>
+            </a:r>
+          </a:p>
+          <a:p>
+            <a:r>
+              <a:rPr lang="en-US" dirty="0"/>
+              <a:t>When we compiled code with any of the above the compiler compiled our code to native code for the machine its running on e.g.(windows or macOS)</a:t>
+            </a:r>
+          </a:p>
+          <a:p>
+            <a:r>
+              <a:rPr lang="en-US" dirty="0"/>
+              <a:t>But we have different hardware's , and that means that the above wont be possible.</a:t>
+            </a:r>
+          </a:p>
+          <a:p>
+            <a:r>
+              <a:rPr lang="en-US" dirty="0"/>
+              <a:t>C# however changed that </a:t>
+            </a:r>
+          </a:p>
+        </p:txBody>
+      </p:sp>
+    </p:spTree>
+    <p:extLst>
+      <p:ext uri="{BB962C8B-B14F-4D97-AF65-F5344CB8AC3E}">
+        <p14:creationId xmlns:p14="http://schemas.microsoft.com/office/powerpoint/2010/main" val="2430405489"/>
+      </p:ext>
+    </p:extLst>
+  </p:cSld>
+  <p:clrMapOvr>
+    <a:masterClrMapping/>
+  </p:clrMapOvr>
+</p:sld>
+</file>
+
+<file path=ppt/slides/slide4.xml><?xml version="1.0" encoding="utf-8"?>
+<p:sld xmlns:a="http://schemas.openxmlformats.org/drawingml/2006/main" xmlns:r="http://schemas.openxmlformats.org/officeDocument/2006/relationships" xmlns:p="http://schemas.openxmlformats.org/presentationml/2006/main">
+  <p:cSld>
+    <p:spTree>
+      <p:nvGrpSpPr>
+        <p:cNvPr id="1" name=""/>
+        <p:cNvGrpSpPr/>
+        <p:nvPr/>
+      </p:nvGrpSpPr>
+      <p:grpSpPr>
+        <a:xfrm>
+          <a:off x="0" y="0"/>
+          <a:ext cx="0" cy="0"/>
+          <a:chOff x="0" y="0"/>
+          <a:chExt cx="0" cy="0"/>
+        </a:xfrm>
+      </p:grpSpPr>
+      <p:sp>
+        <p:nvSpPr>
+          <p:cNvPr id="2" name="Title 1">
+            <a:extLst>
+              <a:ext uri="{FF2B5EF4-FFF2-40B4-BE49-F238E27FC236}">
                 <a16:creationId xmlns:a16="http://schemas.microsoft.com/office/drawing/2014/main" id="{A468724E-8C30-84FC-E9C5-19C5AF19665C}"/>
               </a:ext>
             </a:extLst>
@@ -28636,7 +28944,7 @@
 </p:sld>
 </file>
 
-<file path=ppt/slides/slide4.xml><?xml version="1.0" encoding="utf-8"?>
+<file path=ppt/slides/slide5.xml><?xml version="1.0" encoding="utf-8"?>
 <p:sld xmlns:a="http://schemas.openxmlformats.org/drawingml/2006/main" xmlns:r="http://schemas.openxmlformats.org/officeDocument/2006/relationships" xmlns:p="http://schemas.openxmlformats.org/presentationml/2006/main">
   <p:cSld>
     <p:spTree>
@@ -28747,7 +29055,7 @@
 </p:sld>
 </file>
 
-<file path=ppt/slides/slide5.xml><?xml version="1.0" encoding="utf-8"?>
+<file path=ppt/slides/slide6.xml><?xml version="1.0" encoding="utf-8"?>
 <p:sld xmlns:a="http://schemas.openxmlformats.org/drawingml/2006/main" xmlns:r="http://schemas.openxmlformats.org/officeDocument/2006/relationships" xmlns:p="http://schemas.openxmlformats.org/presentationml/2006/main">
   <p:cSld>
     <p:spTree>
@@ -28887,7 +29195,7 @@
 </p:sld>
 </file>
 
-<file path=ppt/slides/slide6.xml><?xml version="1.0" encoding="utf-8"?>
+<file path=ppt/slides/slide7.xml><?xml version="1.0" encoding="utf-8"?>
 <p:sld xmlns:a="http://schemas.openxmlformats.org/drawingml/2006/main" xmlns:r="http://schemas.openxmlformats.org/officeDocument/2006/relationships" xmlns:p="http://schemas.openxmlformats.org/presentationml/2006/main">
   <p:cSld>
     <p:spTree>
@@ -29036,7 +29344,7 @@
 </p:sld>
 </file>
 
-<file path=ppt/slides/slide7.xml><?xml version="1.0" encoding="utf-8"?>
+<file path=ppt/slides/slide8.xml><?xml version="1.0" encoding="utf-8"?>
 <p:sld xmlns:a="http://schemas.openxmlformats.org/drawingml/2006/main" xmlns:r="http://schemas.openxmlformats.org/officeDocument/2006/relationships" xmlns:p="http://schemas.openxmlformats.org/presentationml/2006/main">
   <p:cSld>
     <p:spTree>
@@ -29157,7 +29465,7 @@
 </p:sld>
 </file>
 
-<file path=ppt/slides/slide8.xml><?xml version="1.0" encoding="utf-8"?>
+<file path=ppt/slides/slide9.xml><?xml version="1.0" encoding="utf-8"?>
 <p:sld xmlns:a="http://schemas.openxmlformats.org/drawingml/2006/main" xmlns:r="http://schemas.openxmlformats.org/officeDocument/2006/relationships" xmlns:p="http://schemas.openxmlformats.org/presentationml/2006/main">
   <p:cSld>
     <p:spTree>
@@ -29295,196 +29603,6 @@
     <p:extLst>
       <p:ext uri="{BB962C8B-B14F-4D97-AF65-F5344CB8AC3E}">
         <p14:creationId xmlns:p14="http://schemas.microsoft.com/office/powerpoint/2010/main" val="14339933"/>
-      </p:ext>
-    </p:extLst>
-  </p:cSld>
-  <p:clrMapOvr>
-    <a:masterClrMapping/>
-  </p:clrMapOvr>
-</p:sld>
-</file>
-
-<file path=ppt/slides/slide9.xml><?xml version="1.0" encoding="utf-8"?>
-<p:sld xmlns:a="http://schemas.openxmlformats.org/drawingml/2006/main" xmlns:r="http://schemas.openxmlformats.org/officeDocument/2006/relationships" xmlns:p="http://schemas.openxmlformats.org/presentationml/2006/main">
-  <p:cSld>
-    <p:spTree>
-      <p:nvGrpSpPr>
-        <p:cNvPr id="1" name=""/>
-        <p:cNvGrpSpPr/>
-        <p:nvPr/>
-      </p:nvGrpSpPr>
-      <p:grpSpPr>
-        <a:xfrm>
-          <a:off x="0" y="0"/>
-          <a:ext cx="0" cy="0"/>
-          <a:chOff x="0" y="0"/>
-          <a:chExt cx="0" cy="0"/>
-        </a:xfrm>
-      </p:grpSpPr>
-      <p:sp>
-        <p:nvSpPr>
-          <p:cNvPr id="2" name="Title 1">
-            <a:extLst>
-              <a:ext uri="{FF2B5EF4-FFF2-40B4-BE49-F238E27FC236}">
-                <a16:creationId xmlns:a16="http://schemas.microsoft.com/office/drawing/2014/main" id="{A05F68E3-B9B8-2A58-DD21-F2C2E665ED15}"/>
-              </a:ext>
-            </a:extLst>
-          </p:cNvPr>
-          <p:cNvSpPr>
-            <a:spLocks noGrp="1"/>
-          </p:cNvSpPr>
-          <p:nvPr>
-            <p:ph type="title"/>
-          </p:nvPr>
-        </p:nvSpPr>
-        <p:spPr>
-          <a:xfrm>
-            <a:off x="609600" y="807467"/>
-            <a:ext cx="11109820" cy="668995"/>
-          </a:xfrm>
-        </p:spPr>
-        <p:txBody>
-          <a:bodyPr/>
-          <a:lstStyle/>
-          <a:p>
-            <a:r>
-              <a:rPr lang="en-US" dirty="0"/>
-              <a:t>Introduction to the  .NET Framework</a:t>
-            </a:r>
-          </a:p>
-        </p:txBody>
-      </p:sp>
-      <p:sp>
-        <p:nvSpPr>
-          <p:cNvPr id="3" name="Text Placeholder 2">
-            <a:extLst>
-              <a:ext uri="{FF2B5EF4-FFF2-40B4-BE49-F238E27FC236}">
-                <a16:creationId xmlns:a16="http://schemas.microsoft.com/office/drawing/2014/main" id="{F6501655-68EE-EF22-94CF-111088B41AEA}"/>
-              </a:ext>
-            </a:extLst>
-          </p:cNvPr>
-          <p:cNvSpPr>
-            <a:spLocks noGrp="1"/>
-          </p:cNvSpPr>
-          <p:nvPr>
-            <p:ph type="body" idx="1"/>
-          </p:nvPr>
-        </p:nvSpPr>
-        <p:spPr>
-          <a:xfrm>
-            <a:off x="609600" y="2382472"/>
-            <a:ext cx="11227266" cy="4085439"/>
-          </a:xfrm>
-        </p:spPr>
-        <p:txBody>
-          <a:bodyPr/>
-          <a:lstStyle/>
-          <a:p>
-            <a:pPr marL="152396" indent="0">
-              <a:buNone/>
-            </a:pPr>
-            <a:r>
-              <a:rPr lang="en-US" sz="1800" b="1" i="0" dirty="0">
-                <a:solidFill>
-                  <a:srgbClr val="000000"/>
-                </a:solidFill>
-                <a:effectLst/>
-                <a:latin typeface="arial" panose="020B0604020202020204" pitchFamily="34" charset="0"/>
-              </a:rPr>
-              <a:t>NET</a:t>
-            </a:r>
-            <a:r>
-              <a:rPr lang="en-US" sz="1800" b="0" i="0" dirty="0">
-                <a:solidFill>
-                  <a:srgbClr val="000000"/>
-                </a:solidFill>
-                <a:effectLst/>
-                <a:latin typeface="arial" panose="020B0604020202020204" pitchFamily="34" charset="0"/>
-              </a:rPr>
-              <a:t> stands for </a:t>
-            </a:r>
-            <a:r>
-              <a:rPr lang="en-US" sz="1800" b="1" i="0" dirty="0">
-                <a:solidFill>
-                  <a:srgbClr val="000000"/>
-                </a:solidFill>
-                <a:effectLst/>
-                <a:latin typeface="arial" panose="020B0604020202020204" pitchFamily="34" charset="0"/>
-              </a:rPr>
-              <a:t>Network Enabled Technology</a:t>
-            </a:r>
-            <a:r>
-              <a:rPr lang="en-US" sz="1800" b="0" i="0" dirty="0">
-                <a:solidFill>
-                  <a:srgbClr val="000000"/>
-                </a:solidFill>
-                <a:effectLst/>
-                <a:latin typeface="arial" panose="020B0604020202020204" pitchFamily="34" charset="0"/>
-              </a:rPr>
-              <a:t> (Internet). In .NET, dot (.) refers to </a:t>
-            </a:r>
-            <a:r>
-              <a:rPr lang="en-US" sz="1800" b="1" i="0" dirty="0">
-                <a:solidFill>
-                  <a:srgbClr val="000000"/>
-                </a:solidFill>
-                <a:effectLst/>
-                <a:latin typeface="arial" panose="020B0604020202020204" pitchFamily="34" charset="0"/>
-              </a:rPr>
-              <a:t>Object-Oriented,</a:t>
-            </a:r>
-            <a:r>
-              <a:rPr lang="en-US" sz="1800" b="0" i="0" dirty="0">
-                <a:solidFill>
-                  <a:srgbClr val="000000"/>
-                </a:solidFill>
-                <a:effectLst/>
-                <a:latin typeface="arial" panose="020B0604020202020204" pitchFamily="34" charset="0"/>
-              </a:rPr>
-              <a:t> and NET refers to the internet. So, the complete .NET means through Object-Oriented we can implement internet-based applications.</a:t>
-            </a:r>
-          </a:p>
-          <a:p>
-            <a:pPr marL="152396" indent="0">
-              <a:buNone/>
-            </a:pPr>
-            <a:r>
-              <a:rPr lang="en-US" sz="1800" dirty="0"/>
-              <a:t>According to Microsoft, .NET is a Free, Cross-Platform, Open-Source developer platform for building many different types of applications. With .NET, we can use multiple languages (C#, VB, F#, etc.), Editors (Visual Studio, Visual Studio Code, Visual Studio for Mac, OmniSharp, JetBrains Rider, etc.), and Libraries to build for Web, Mobile, Desktop, Games, IoT, and more.</a:t>
-            </a:r>
-          </a:p>
-          <a:p>
-            <a:pPr marL="152396" indent="0">
-              <a:buNone/>
-            </a:pPr>
-            <a:r>
-              <a:rPr lang="en-US" sz="1800" dirty="0"/>
-              <a:t>Cross Platform: Whether you are working in C#, F#, or Visual Basic, your code will run on any compatible operating system. You can build many types of apps with .NET. Some are Cross-Platform, and some target a specific set of operating systems and devices.</a:t>
-            </a:r>
-          </a:p>
-          <a:p>
-            <a:pPr marL="152396" indent="0">
-              <a:buNone/>
-            </a:pPr>
-            <a:r>
-              <a:rPr lang="en-US" sz="1800" dirty="0"/>
-              <a:t>Libraries: To extend functionality, Microsoft and others maintain a healthy .NET package ecosystem. </a:t>
-            </a:r>
-            <a:r>
-              <a:rPr lang="en-US" sz="1800" b="1" dirty="0"/>
-              <a:t>NuGet</a:t>
-            </a:r>
-            <a:r>
-              <a:rPr lang="en-US" sz="1800" dirty="0"/>
-              <a:t> is a package manager built specifically for .NET that contains over 100,000 packages.</a:t>
-            </a:r>
-          </a:p>
-        </p:txBody>
-      </p:sp>
-    </p:spTree>
-    <p:extLst>
-      <p:ext uri="{BB962C8B-B14F-4D97-AF65-F5344CB8AC3E}">
-        <p14:creationId xmlns:p14="http://schemas.microsoft.com/office/powerpoint/2010/main" val="2998746075"/>
       </p:ext>
     </p:extLst>
   </p:cSld>

</xml_diff>